<commit_message>
lecture 9 video and slide updates.
</commit_message>
<xml_diff>
--- a/Lectures/Week_4/CSE 599V Lecture 9 - Estimating Confidence in Models and Parameters- I .pptx
+++ b/Lectures/Week_4/CSE 599V Lecture 9 - Estimating Confidence in Models and Parameters- I .pptx
@@ -5963,8 +5963,8 @@
           </p:sp>
         </mc:Fallback>
       </mc:AlternateContent>
-      <mc:AlternateContent xmlns:mc="http://schemas.openxmlformats.org/markup-compatibility/2006" xmlns:a14="http://schemas.microsoft.com/office/drawing/2010/main">
-        <mc:Choice Requires="a14">
+      <mc:AlternateContent xmlns:mc="http://schemas.openxmlformats.org/markup-compatibility/2006">
+        <mc:Choice xmlns:a14="http://schemas.microsoft.com/office/drawing/2010/main" Requires="a14">
           <p:sp>
             <p:nvSpPr>
               <p:cNvPr id="5" name="TextBox 4">
@@ -6108,7 +6108,7 @@
                         <a:rPr lang="en-US" sz="2400" b="0" i="1" smtClean="0">
                           <a:latin typeface="Cambria Math" panose="02040503050406030204" pitchFamily="18" charset="0"/>
                         </a:rPr>
-                        <m:t>𝐶</m:t>
+                        <m:t>𝐵</m:t>
                       </m:r>
                     </m:oMath>
                   </m:oMathPara>
@@ -6118,7 +6118,7 @@
             </p:txBody>
           </p:sp>
         </mc:Choice>
-        <mc:Fallback xmlns="">
+        <mc:Fallback>
           <p:sp>
             <p:nvSpPr>
               <p:cNvPr id="5" name="TextBox 4">

</xml_diff>